<commit_message>
Some more tuning changes to respiration actions.  Lobar pneumonia looks better.  Also pushing a working copy of nervous documentation as well as updated Nervous work flow figures for website.
</commit_message>
<xml_diff>
--- a/share/doc/working/NervousWorking.pptx
+++ b/share/doc/working/NervousWorking.pptx
@@ -288,7 +288,7 @@
           <a:p>
             <a:fld id="{286BE349-6026-4AE3-B9EC-5E0FE665B52F}" type="datetimeFigureOut">
               <a:rPr lang="en-US" smtClean="0"/>
-              <a:t>2/9/2017</a:t>
+              <a:t>8/2/2018</a:t>
             </a:fld>
             <a:endParaRPr lang="en-US"/>
           </a:p>
@@ -458,7 +458,7 @@
           <a:p>
             <a:fld id="{286BE349-6026-4AE3-B9EC-5E0FE665B52F}" type="datetimeFigureOut">
               <a:rPr lang="en-US" smtClean="0"/>
-              <a:t>2/9/2017</a:t>
+              <a:t>8/2/2018</a:t>
             </a:fld>
             <a:endParaRPr lang="en-US"/>
           </a:p>
@@ -638,7 +638,7 @@
           <a:p>
             <a:fld id="{286BE349-6026-4AE3-B9EC-5E0FE665B52F}" type="datetimeFigureOut">
               <a:rPr lang="en-US" smtClean="0"/>
-              <a:t>2/9/2017</a:t>
+              <a:t>8/2/2018</a:t>
             </a:fld>
             <a:endParaRPr lang="en-US"/>
           </a:p>
@@ -808,7 +808,7 @@
           <a:p>
             <a:fld id="{286BE349-6026-4AE3-B9EC-5E0FE665B52F}" type="datetimeFigureOut">
               <a:rPr lang="en-US" smtClean="0"/>
-              <a:t>2/9/2017</a:t>
+              <a:t>8/2/2018</a:t>
             </a:fld>
             <a:endParaRPr lang="en-US"/>
           </a:p>
@@ -1054,7 +1054,7 @@
           <a:p>
             <a:fld id="{286BE349-6026-4AE3-B9EC-5E0FE665B52F}" type="datetimeFigureOut">
               <a:rPr lang="en-US" smtClean="0"/>
-              <a:t>2/9/2017</a:t>
+              <a:t>8/2/2018</a:t>
             </a:fld>
             <a:endParaRPr lang="en-US"/>
           </a:p>
@@ -1342,7 +1342,7 @@
           <a:p>
             <a:fld id="{286BE349-6026-4AE3-B9EC-5E0FE665B52F}" type="datetimeFigureOut">
               <a:rPr lang="en-US" smtClean="0"/>
-              <a:t>2/9/2017</a:t>
+              <a:t>8/2/2018</a:t>
             </a:fld>
             <a:endParaRPr lang="en-US"/>
           </a:p>
@@ -1764,7 +1764,7 @@
           <a:p>
             <a:fld id="{286BE349-6026-4AE3-B9EC-5E0FE665B52F}" type="datetimeFigureOut">
               <a:rPr lang="en-US" smtClean="0"/>
-              <a:t>2/9/2017</a:t>
+              <a:t>8/2/2018</a:t>
             </a:fld>
             <a:endParaRPr lang="en-US"/>
           </a:p>
@@ -1882,7 +1882,7 @@
           <a:p>
             <a:fld id="{286BE349-6026-4AE3-B9EC-5E0FE665B52F}" type="datetimeFigureOut">
               <a:rPr lang="en-US" smtClean="0"/>
-              <a:t>2/9/2017</a:t>
+              <a:t>8/2/2018</a:t>
             </a:fld>
             <a:endParaRPr lang="en-US"/>
           </a:p>
@@ -1977,7 +1977,7 @@
           <a:p>
             <a:fld id="{286BE349-6026-4AE3-B9EC-5E0FE665B52F}" type="datetimeFigureOut">
               <a:rPr lang="en-US" smtClean="0"/>
-              <a:t>2/9/2017</a:t>
+              <a:t>8/2/2018</a:t>
             </a:fld>
             <a:endParaRPr lang="en-US"/>
           </a:p>
@@ -2254,7 +2254,7 @@
           <a:p>
             <a:fld id="{286BE349-6026-4AE3-B9EC-5E0FE665B52F}" type="datetimeFigureOut">
               <a:rPr lang="en-US" smtClean="0"/>
-              <a:t>2/9/2017</a:t>
+              <a:t>8/2/2018</a:t>
             </a:fld>
             <a:endParaRPr lang="en-US"/>
           </a:p>
@@ -2507,7 +2507,7 @@
           <a:p>
             <a:fld id="{286BE349-6026-4AE3-B9EC-5E0FE665B52F}" type="datetimeFigureOut">
               <a:rPr lang="en-US" smtClean="0"/>
-              <a:t>2/9/2017</a:t>
+              <a:t>8/2/2018</a:t>
             </a:fld>
             <a:endParaRPr lang="en-US"/>
           </a:p>
@@ -2720,7 +2720,7 @@
           <a:p>
             <a:fld id="{286BE349-6026-4AE3-B9EC-5E0FE665B52F}" type="datetimeFigureOut">
               <a:rPr lang="en-US" smtClean="0"/>
-              <a:t>2/9/2017</a:t>
+              <a:t>8/2/2018</a:t>
             </a:fld>
             <a:endParaRPr lang="en-US"/>
           </a:p>
@@ -3103,7 +3103,7 @@
         </p:nvSpPr>
         <p:spPr>
           <a:xfrm rot="16200000">
-            <a:off x="3243884" y="3048000"/>
+            <a:off x="3342028" y="3151188"/>
             <a:ext cx="457200" cy="457200"/>
           </a:xfrm>
           <a:prstGeom prst="downArrow">
@@ -3147,8 +3147,8 @@
         </p:nvSpPr>
         <p:spPr>
           <a:xfrm>
-            <a:off x="1447800" y="3009897"/>
-            <a:ext cx="1643821" cy="533400"/>
+            <a:off x="1371600" y="3009897"/>
+            <a:ext cx="1828800" cy="723904"/>
           </a:xfrm>
           <a:prstGeom prst="roundRect">
             <a:avLst/>
@@ -3195,6 +3195,28 @@
             </a:r>
             <a:endParaRPr lang="en-US" sz="1050" dirty="0" smtClean="0"/>
           </a:p>
+          <a:p>
+            <a:pPr marL="119063" indent="-119063">
+              <a:buFont typeface="Arial" pitchFamily="34" charset="0"/>
+              <a:buChar char="•"/>
+            </a:pPr>
+            <a:r>
+              <a:rPr lang="en-US" sz="1050" dirty="0" err="1" smtClean="0"/>
+              <a:t>ChemoreceptorFeedback</a:t>
+            </a:r>
+            <a:endParaRPr lang="en-US" sz="1050" dirty="0" smtClean="0"/>
+          </a:p>
+          <a:p>
+            <a:pPr marL="119063" indent="-119063">
+              <a:buFont typeface="Arial" pitchFamily="34" charset="0"/>
+              <a:buChar char="•"/>
+            </a:pPr>
+            <a:r>
+              <a:rPr lang="en-US" sz="1050" dirty="0" err="1" smtClean="0"/>
+              <a:t>ChekcPainStimulus</a:t>
+            </a:r>
+            <a:endParaRPr lang="en-US" sz="1050" dirty="0" smtClean="0"/>
+          </a:p>
         </p:txBody>
       </p:sp>
       <p:sp>
@@ -3205,8 +3227,8 @@
         </p:nvSpPr>
         <p:spPr>
           <a:xfrm>
-            <a:off x="3828294" y="3048000"/>
-            <a:ext cx="1658106" cy="609600"/>
+            <a:off x="3828294" y="3025777"/>
+            <a:ext cx="1658106" cy="708023"/>
           </a:xfrm>
           <a:prstGeom prst="roundRect">
             <a:avLst/>
@@ -3243,7 +3265,7 @@
             </a:r>
           </a:p>
           <a:p>
-            <a:pPr marL="171450" indent="-171450" algn="ctr">
+            <a:pPr marL="171450" indent="-171450">
               <a:buFont typeface="Arial" pitchFamily="34" charset="0"/>
               <a:buChar char="•"/>
             </a:pPr>
@@ -3253,7 +3275,7 @@
                   <a:prstClr val="white"/>
                 </a:solidFill>
               </a:rPr>
-              <a:t>CheckBrainStatus</a:t>
+              <a:t>CheckNervousStatus</a:t>
             </a:r>
             <a:endParaRPr lang="en-US" sz="1050" dirty="0" smtClean="0">
               <a:solidFill>
@@ -3262,7 +3284,7 @@
             </a:endParaRPr>
           </a:p>
           <a:p>
-            <a:pPr marL="171450" indent="-171450" algn="ctr">
+            <a:pPr marL="171450" indent="-171450">
               <a:buFont typeface="Arial" pitchFamily="34" charset="0"/>
               <a:buChar char="•"/>
             </a:pPr>
@@ -3290,8 +3312,8 @@
         </p:nvSpPr>
         <p:spPr>
           <a:xfrm>
-            <a:off x="6172200" y="3047997"/>
-            <a:ext cx="892589" cy="457200"/>
+            <a:off x="6172199" y="3212615"/>
+            <a:ext cx="892589" cy="318467"/>
           </a:xfrm>
           <a:prstGeom prst="roundRect">
             <a:avLst/>
@@ -3392,7 +3414,7 @@
         </p:nvSpPr>
         <p:spPr>
           <a:xfrm rot="16200000">
-            <a:off x="5584800" y="3054455"/>
+            <a:off x="5587157" y="3143249"/>
             <a:ext cx="457200" cy="457200"/>
           </a:xfrm>
           <a:prstGeom prst="downArrow">

</xml_diff>